<commit_message>
Updated slides + programme
</commit_message>
<xml_diff>
--- a/2022/ESS_May_June_2022/Day4_Tuesday_July_5th/09_Polarisation/Polarised_neutrons_in_McStas.pptx
+++ b/2022/ESS_May_June_2022/Day4_Tuesday_July_5th/09_Polarisation/Polarised_neutrons_in_McStas.pptx
@@ -29046,8 +29046,8 @@
         </p:nvSpPr>
         <p:spPr>
           <a:xfrm>
-            <a:off x="1900986" y="71642"/>
-            <a:ext cx="9312375" cy="972717"/>
+            <a:off x="1900986" y="-461159"/>
+            <a:ext cx="9312375" cy="972718"/>
           </a:xfrm>
           <a:prstGeom prst="rect">
             <a:avLst/>
@@ -29074,8 +29074,8 @@
         </p:nvSpPr>
         <p:spPr>
           <a:xfrm>
-            <a:off x="1774800" y="1247401"/>
-            <a:ext cx="9564748" cy="5004577"/>
+            <a:off x="1774800" y="800779"/>
+            <a:ext cx="9564748" cy="5451199"/>
           </a:xfrm>
           <a:prstGeom prst="rect">
             <a:avLst/>
@@ -29129,6 +29129,15 @@
             </a:r>
             <a:r>
               <a:t>)</a:t>
+            </a:r>
+          </a:p>
+          <a:p>
+            <a:pPr/>
+          </a:p>
+          <a:p>
+            <a:pPr/>
+            <a:r>
+              <a:t>Pol_Bfield placement can be confusing depending on choice of geometry-parts… </a:t>
             </a:r>
             <a:br/>
           </a:p>

</xml_diff>